<commit_message>
Ver 1.5.3   This is commit before changes to   coordinate system [x,y] -> [y,x].   On branch CleanWebsite   Changes to be committed:  	modified:   Conway's Game of Life.pptx  	modified:   GoL.v11.suo  	modified:   Scripts/Controls.js  	modified:   Scripts/GoL.js  	modified:   index.html
  Done:
    Removed button "Previous Generation"
  ToDo:
    Change coordinate system.
    Implement algorithm to get closest
	organism to starting point, + glider
	rotation.
	Repair canvas resizing.
</commit_message>
<xml_diff>
--- a/Conway's Game of Life.pptx
+++ b/Conway's Game of Life.pptx
@@ -5,17 +5,19 @@
     <p:sldMasterId id="2147483648" r:id="rId1"/>
   </p:sldMasterIdLst>
   <p:notesMasterIdLst>
-    <p:notesMasterId r:id="rId10"/>
+    <p:notesMasterId r:id="rId12"/>
   </p:notesMasterIdLst>
   <p:sldIdLst>
     <p:sldId id="256" r:id="rId2"/>
-    <p:sldId id="264" r:id="rId3"/>
-    <p:sldId id="257" r:id="rId4"/>
-    <p:sldId id="258" r:id="rId5"/>
-    <p:sldId id="259" r:id="rId6"/>
-    <p:sldId id="262" r:id="rId7"/>
-    <p:sldId id="261" r:id="rId8"/>
-    <p:sldId id="260" r:id="rId9"/>
+    <p:sldId id="265" r:id="rId3"/>
+    <p:sldId id="264" r:id="rId4"/>
+    <p:sldId id="257" r:id="rId5"/>
+    <p:sldId id="258" r:id="rId6"/>
+    <p:sldId id="259" r:id="rId7"/>
+    <p:sldId id="262" r:id="rId8"/>
+    <p:sldId id="266" r:id="rId9"/>
+    <p:sldId id="261" r:id="rId10"/>
+    <p:sldId id="260" r:id="rId11"/>
   </p:sldIdLst>
   <p:sldSz cx="9144000" cy="6858000" type="screen4x3"/>
   <p:notesSz cx="6858000" cy="9144000"/>
@@ -200,7 +202,7 @@
             <a:fld id="{021F6B4D-F637-4364-9B64-02E2D6AD5AEE}" type="datetimeFigureOut">
               <a:rPr lang="en-GB" smtClean="0"/>
               <a:pPr/>
-              <a:t>29/11/2013</a:t>
+              <a:t>11/12/2013</a:t>
             </a:fld>
             <a:endParaRPr lang="en-GB"/>
           </a:p>
@@ -513,87 +515,6 @@
           <a:lstStyle/>
           <a:p>
             <a:r>
-              <a:rPr lang="en-GB" dirty="0" smtClean="0"/>
-              <a:t>The three main components of a Cellular</a:t>
-            </a:r>
-          </a:p>
-          <a:p>
-            <a:r>
-              <a:rPr lang="en-GB" dirty="0" smtClean="0"/>
-              <a:t>Automata are:</a:t>
-            </a:r>
-          </a:p>
-          <a:p>
-            <a:r>
-              <a:rPr lang="en-GB" dirty="0" smtClean="0"/>
-              <a:t>➟The array dimension (Vast Parallelism: Cellular computing can</a:t>
-            </a:r>
-          </a:p>
-          <a:p>
-            <a:r>
-              <a:rPr lang="en-GB" dirty="0" smtClean="0"/>
-              <a:t>involve 10^5 or more cells)</a:t>
-            </a:r>
-          </a:p>
-          <a:p>
-            <a:r>
-              <a:rPr lang="en-GB" dirty="0" smtClean="0"/>
-              <a:t>➟The </a:t>
-            </a:r>
-            <a:r>
-              <a:rPr lang="en-GB" dirty="0" err="1" smtClean="0"/>
-              <a:t>neighborhood</a:t>
-            </a:r>
-            <a:r>
-              <a:rPr lang="en-GB" dirty="0" smtClean="0"/>
-              <a:t> structure (Locality)</a:t>
-            </a:r>
-          </a:p>
-          <a:p>
-            <a:r>
-              <a:rPr lang="en-GB" dirty="0" smtClean="0"/>
-              <a:t>➟The transition rule</a:t>
-            </a:r>
-          </a:p>
-          <a:p>
-            <a:endParaRPr lang="en-US" dirty="0" smtClean="0"/>
-          </a:p>
-          <a:p>
-            <a:r>
-              <a:rPr lang="en-GB" dirty="0" smtClean="0"/>
-              <a:t>(Simplicity): the basic processing element, the cell, is simple</a:t>
-            </a:r>
-          </a:p>
-          <a:p>
-            <a:r>
-              <a:rPr lang="en-GB" dirty="0" smtClean="0"/>
-              <a:t>is the smallest structural and functional unit of all living organisms, which has all the basic qualities of life. </a:t>
-            </a:r>
-            <a:r>
-              <a:rPr lang="en-GB" sz="1200" b="0" i="0" u="none" strike="noStrike" kern="1200" dirty="0" smtClean="0">
-                <a:solidFill>
-                  <a:schemeClr val="tx1"/>
-                </a:solidFill>
-                <a:latin typeface="+mn-lt"/>
-                <a:ea typeface="+mn-ea"/>
-                <a:cs typeface="+mn-cs"/>
-                <a:hlinkClick r:id="rId3" tooltip="Jan Evangelista Purkyně"/>
-              </a:rPr>
-              <a:t>Jan Evangelista </a:t>
-            </a:r>
-            <a:r>
-              <a:rPr lang="en-GB" sz="1200" b="0" i="0" u="none" strike="noStrike" kern="1200" dirty="0" err="1" smtClean="0">
-                <a:solidFill>
-                  <a:schemeClr val="tx1"/>
-                </a:solidFill>
-                <a:latin typeface="+mn-lt"/>
-                <a:ea typeface="+mn-ea"/>
-                <a:cs typeface="+mn-cs"/>
-                <a:hlinkClick r:id="rId3" tooltip="Jan Evangelista Purkyně"/>
-              </a:rPr>
-              <a:t>Purkyně</a:t>
-            </a:r>
-            <a:r>
               <a:rPr lang="en-GB" sz="1200" b="0" i="0" kern="1200" dirty="0" smtClean="0">
                 <a:solidFill>
                   <a:schemeClr val="tx1"/>
@@ -602,17 +523,7 @@
                 <a:ea typeface="+mn-ea"/>
                 <a:cs typeface="+mn-cs"/>
               </a:rPr>
-              <a:t>,</a:t>
-            </a:r>
-            <a:endParaRPr lang="en-US" dirty="0" smtClean="0"/>
-          </a:p>
-          <a:p>
-            <a:endParaRPr lang="en-US" dirty="0" smtClean="0"/>
-          </a:p>
-          <a:p>
-            <a:r>
-              <a:rPr lang="en-GB" dirty="0" smtClean="0"/>
-              <a:t>Cellular Computing = simplicity + vast parallelism + locality</a:t>
+              <a:t>Create an interactive implementation of the Game of Life grid, where a player can select starting points for a variety of blinkers. The system then sends gliders to destroy them, resulting in chaos. Alternatively, system randomly sets some blinkers and player sets starting point for gliders. Documentation should clearly explain algorithms used to generate the life-forms.</a:t>
             </a:r>
             <a:endParaRPr lang="en-GB" dirty="0"/>
           </a:p>
@@ -636,7 +547,7 @@
             <a:fld id="{BC16559C-DBE4-4E87-B899-8F22E0966332}" type="slidenum">
               <a:rPr lang="en-GB" smtClean="0"/>
               <a:pPr/>
-              <a:t>3</a:t>
+              <a:t>2</a:t>
             </a:fld>
             <a:endParaRPr lang="en-GB"/>
           </a:p>
@@ -698,22 +609,106 @@
           <a:p>
             <a:r>
               <a:rPr lang="en-GB" dirty="0" smtClean="0"/>
-              <a:t>A dead cell with exactly three live neighbours becomes a live cell (birth).</a:t>
+              <a:t>The three main components of a Cellular</a:t>
             </a:r>
           </a:p>
           <a:p>
             <a:r>
               <a:rPr lang="en-GB" dirty="0" smtClean="0"/>
-              <a:t>A live cell with two or three live neighbours stays alive (survival).</a:t>
+              <a:t>Automata are:</a:t>
             </a:r>
           </a:p>
           <a:p>
             <a:r>
               <a:rPr lang="en-GB" dirty="0" smtClean="0"/>
-              <a:t>In all other cases, a cell dies or remains dead (overcrowding or loneliness).</a:t>
-            </a:r>
-          </a:p>
-          <a:p>
+              <a:t>➟The array dimension (Vast Parallelism: Cellular computing can</a:t>
+            </a:r>
+          </a:p>
+          <a:p>
+            <a:r>
+              <a:rPr lang="en-GB" dirty="0" smtClean="0"/>
+              <a:t>involve 10^5 or more cells)</a:t>
+            </a:r>
+          </a:p>
+          <a:p>
+            <a:r>
+              <a:rPr lang="en-GB" dirty="0" smtClean="0"/>
+              <a:t>➟The </a:t>
+            </a:r>
+            <a:r>
+              <a:rPr lang="en-GB" dirty="0" err="1" smtClean="0"/>
+              <a:t>neighborhood</a:t>
+            </a:r>
+            <a:r>
+              <a:rPr lang="en-GB" dirty="0" smtClean="0"/>
+              <a:t> structure (Locality)</a:t>
+            </a:r>
+          </a:p>
+          <a:p>
+            <a:r>
+              <a:rPr lang="en-GB" dirty="0" smtClean="0"/>
+              <a:t>➟The transition rule</a:t>
+            </a:r>
+          </a:p>
+          <a:p>
+            <a:endParaRPr lang="en-US" dirty="0" smtClean="0"/>
+          </a:p>
+          <a:p>
+            <a:r>
+              <a:rPr lang="en-GB" dirty="0" smtClean="0"/>
+              <a:t>(Simplicity): the basic processing element, the cell, is simple</a:t>
+            </a:r>
+          </a:p>
+          <a:p>
+            <a:r>
+              <a:rPr lang="en-GB" dirty="0" smtClean="0"/>
+              <a:t>is the smallest structural and functional unit of all living organisms, which has all the basic qualities of life. </a:t>
+            </a:r>
+            <a:r>
+              <a:rPr lang="en-GB" sz="1200" b="0" i="0" u="none" strike="noStrike" kern="1200" dirty="0" smtClean="0">
+                <a:solidFill>
+                  <a:schemeClr val="tx1"/>
+                </a:solidFill>
+                <a:latin typeface="+mn-lt"/>
+                <a:ea typeface="+mn-ea"/>
+                <a:cs typeface="+mn-cs"/>
+                <a:hlinkClick r:id="rId3" tooltip="Jan Evangelista Purkyně"/>
+              </a:rPr>
+              <a:t>Jan Evangelista </a:t>
+            </a:r>
+            <a:r>
+              <a:rPr lang="en-GB" sz="1200" b="0" i="0" u="none" strike="noStrike" kern="1200" dirty="0" err="1" smtClean="0">
+                <a:solidFill>
+                  <a:schemeClr val="tx1"/>
+                </a:solidFill>
+                <a:latin typeface="+mn-lt"/>
+                <a:ea typeface="+mn-ea"/>
+                <a:cs typeface="+mn-cs"/>
+                <a:hlinkClick r:id="rId3" tooltip="Jan Evangelista Purkyně"/>
+              </a:rPr>
+              <a:t>Purkyně</a:t>
+            </a:r>
+            <a:r>
+              <a:rPr lang="en-GB" sz="1200" b="0" i="0" kern="1200" dirty="0" smtClean="0">
+                <a:solidFill>
+                  <a:schemeClr val="tx1"/>
+                </a:solidFill>
+                <a:latin typeface="+mn-lt"/>
+                <a:ea typeface="+mn-ea"/>
+                <a:cs typeface="+mn-cs"/>
+              </a:rPr>
+              <a:t>,</a:t>
+            </a:r>
+            <a:endParaRPr lang="en-US" dirty="0" smtClean="0"/>
+          </a:p>
+          <a:p>
+            <a:endParaRPr lang="en-US" dirty="0" smtClean="0"/>
+          </a:p>
+          <a:p>
+            <a:r>
+              <a:rPr lang="en-GB" dirty="0" smtClean="0"/>
+              <a:t>Cellular Computing = simplicity + vast parallelism + locality</a:t>
+            </a:r>
             <a:endParaRPr lang="en-GB" dirty="0"/>
           </a:p>
         </p:txBody>
@@ -737,6 +732,200 @@
               <a:rPr lang="en-GB" smtClean="0"/>
               <a:pPr/>
               <a:t>4</a:t>
+            </a:fld>
+            <a:endParaRPr lang="en-GB"/>
+          </a:p>
+        </p:txBody>
+      </p:sp>
+    </p:spTree>
+  </p:cSld>
+  <p:clrMapOvr>
+    <a:masterClrMapping/>
+  </p:clrMapOvr>
+</p:notes>
+</file>
+
+<file path=ppt/notesSlides/notesSlide3.xml><?xml version="1.0" encoding="utf-8"?>
+<p:notes xmlns:a="http://schemas.openxmlformats.org/drawingml/2006/main" xmlns:r="http://schemas.openxmlformats.org/officeDocument/2006/relationships" xmlns:p="http://schemas.openxmlformats.org/presentationml/2006/main">
+  <p:cSld>
+    <p:spTree>
+      <p:nvGrpSpPr>
+        <p:cNvPr id="1" name=""/>
+        <p:cNvGrpSpPr/>
+        <p:nvPr/>
+      </p:nvGrpSpPr>
+      <p:grpSpPr>
+        <a:xfrm>
+          <a:off x="0" y="0"/>
+          <a:ext cx="0" cy="0"/>
+          <a:chOff x="0" y="0"/>
+          <a:chExt cx="0" cy="0"/>
+        </a:xfrm>
+      </p:grpSpPr>
+      <p:sp>
+        <p:nvSpPr>
+          <p:cNvPr id="2" name="Slide Image Placeholder 1"/>
+          <p:cNvSpPr>
+            <a:spLocks noGrp="1" noRot="1" noChangeAspect="1"/>
+          </p:cNvSpPr>
+          <p:nvPr>
+            <p:ph type="sldImg"/>
+          </p:nvPr>
+        </p:nvSpPr>
+        <p:spPr/>
+      </p:sp>
+      <p:sp>
+        <p:nvSpPr>
+          <p:cNvPr id="3" name="Notes Placeholder 2"/>
+          <p:cNvSpPr>
+            <a:spLocks noGrp="1"/>
+          </p:cNvSpPr>
+          <p:nvPr>
+            <p:ph type="body" idx="1"/>
+          </p:nvPr>
+        </p:nvSpPr>
+        <p:spPr/>
+        <p:txBody>
+          <a:bodyPr>
+            <a:normAutofit/>
+          </a:bodyPr>
+          <a:lstStyle/>
+          <a:p>
+            <a:r>
+              <a:rPr lang="en-GB" dirty="0" smtClean="0"/>
+              <a:t>A dead cell with exactly three live neighbours becomes a live cell (birth).</a:t>
+            </a:r>
+          </a:p>
+          <a:p>
+            <a:r>
+              <a:rPr lang="en-GB" dirty="0" smtClean="0"/>
+              <a:t>A live cell with two or three live neighbours stays alive (survival).</a:t>
+            </a:r>
+          </a:p>
+          <a:p>
+            <a:r>
+              <a:rPr lang="en-GB" dirty="0" smtClean="0"/>
+              <a:t>In all other cases, a cell dies or remains dead (overcrowding or loneliness).</a:t>
+            </a:r>
+          </a:p>
+          <a:p>
+            <a:endParaRPr lang="en-GB" dirty="0"/>
+          </a:p>
+        </p:txBody>
+      </p:sp>
+      <p:sp>
+        <p:nvSpPr>
+          <p:cNvPr id="4" name="Slide Number Placeholder 3"/>
+          <p:cNvSpPr>
+            <a:spLocks noGrp="1"/>
+          </p:cNvSpPr>
+          <p:nvPr>
+            <p:ph type="sldNum" sz="quarter" idx="10"/>
+          </p:nvPr>
+        </p:nvSpPr>
+        <p:spPr/>
+        <p:txBody>
+          <a:bodyPr/>
+          <a:lstStyle/>
+          <a:p>
+            <a:fld id="{BC16559C-DBE4-4E87-B899-8F22E0966332}" type="slidenum">
+              <a:rPr lang="en-GB" smtClean="0"/>
+              <a:pPr/>
+              <a:t>5</a:t>
+            </a:fld>
+            <a:endParaRPr lang="en-GB"/>
+          </a:p>
+        </p:txBody>
+      </p:sp>
+    </p:spTree>
+  </p:cSld>
+  <p:clrMapOvr>
+    <a:masterClrMapping/>
+  </p:clrMapOvr>
+</p:notes>
+</file>
+
+<file path=ppt/notesSlides/notesSlide4.xml><?xml version="1.0" encoding="utf-8"?>
+<p:notes xmlns:a="http://schemas.openxmlformats.org/drawingml/2006/main" xmlns:r="http://schemas.openxmlformats.org/officeDocument/2006/relationships" xmlns:p="http://schemas.openxmlformats.org/presentationml/2006/main">
+  <p:cSld>
+    <p:spTree>
+      <p:nvGrpSpPr>
+        <p:cNvPr id="1" name=""/>
+        <p:cNvGrpSpPr/>
+        <p:nvPr/>
+      </p:nvGrpSpPr>
+      <p:grpSpPr>
+        <a:xfrm>
+          <a:off x="0" y="0"/>
+          <a:ext cx="0" cy="0"/>
+          <a:chOff x="0" y="0"/>
+          <a:chExt cx="0" cy="0"/>
+        </a:xfrm>
+      </p:grpSpPr>
+      <p:sp>
+        <p:nvSpPr>
+          <p:cNvPr id="2" name="Slide Image Placeholder 1"/>
+          <p:cNvSpPr>
+            <a:spLocks noGrp="1" noRot="1" noChangeAspect="1"/>
+          </p:cNvSpPr>
+          <p:nvPr>
+            <p:ph type="sldImg"/>
+          </p:nvPr>
+        </p:nvSpPr>
+        <p:spPr/>
+      </p:sp>
+      <p:sp>
+        <p:nvSpPr>
+          <p:cNvPr id="3" name="Notes Placeholder 2"/>
+          <p:cNvSpPr>
+            <a:spLocks noGrp="1"/>
+          </p:cNvSpPr>
+          <p:nvPr>
+            <p:ph type="body" idx="1"/>
+          </p:nvPr>
+        </p:nvSpPr>
+        <p:spPr/>
+        <p:txBody>
+          <a:bodyPr>
+            <a:normAutofit/>
+          </a:bodyPr>
+          <a:lstStyle/>
+          <a:p>
+            <a:r>
+              <a:rPr lang="en-US" dirty="0" smtClean="0"/>
+              <a:t>Algorithm</a:t>
+            </a:r>
+            <a:r>
+              <a:rPr lang="en-US" baseline="0" dirty="0" smtClean="0"/>
+              <a:t> of </a:t>
+            </a:r>
+            <a:r>
+              <a:rPr lang="en-US" baseline="0" smtClean="0"/>
+              <a:t>the solution</a:t>
+            </a:r>
+            <a:endParaRPr lang="en-GB"/>
+          </a:p>
+        </p:txBody>
+      </p:sp>
+      <p:sp>
+        <p:nvSpPr>
+          <p:cNvPr id="4" name="Slide Number Placeholder 3"/>
+          <p:cNvSpPr>
+            <a:spLocks noGrp="1"/>
+          </p:cNvSpPr>
+          <p:nvPr>
+            <p:ph type="sldNum" sz="quarter" idx="10"/>
+          </p:nvPr>
+        </p:nvSpPr>
+        <p:spPr/>
+        <p:txBody>
+          <a:bodyPr/>
+          <a:lstStyle/>
+          <a:p>
+            <a:fld id="{BC16559C-DBE4-4E87-B899-8F22E0966332}" type="slidenum">
+              <a:rPr lang="en-GB" smtClean="0"/>
+              <a:pPr/>
+              <a:t>7</a:t>
             </a:fld>
             <a:endParaRPr lang="en-GB"/>
           </a:p>
@@ -932,7 +1121,7 @@
             <a:fld id="{FD48FB5F-08CF-4C15-A255-EF5626F26EBD}" type="datetimeFigureOut">
               <a:rPr lang="en-GB" smtClean="0"/>
               <a:pPr/>
-              <a:t>29/11/2013</a:t>
+              <a:t>11/12/2013</a:t>
             </a:fld>
             <a:endParaRPr lang="en-GB"/>
           </a:p>
@@ -1182,7 +1371,7 @@
             <a:fld id="{FD48FB5F-08CF-4C15-A255-EF5626F26EBD}" type="datetimeFigureOut">
               <a:rPr lang="en-GB" smtClean="0"/>
               <a:pPr/>
-              <a:t>29/11/2013</a:t>
+              <a:t>11/12/2013</a:t>
             </a:fld>
             <a:endParaRPr lang="en-GB"/>
           </a:p>
@@ -1349,7 +1538,7 @@
             <a:fld id="{FD48FB5F-08CF-4C15-A255-EF5626F26EBD}" type="datetimeFigureOut">
               <a:rPr lang="en-GB" smtClean="0"/>
               <a:pPr/>
-              <a:t>29/11/2013</a:t>
+              <a:t>11/12/2013</a:t>
             </a:fld>
             <a:endParaRPr lang="en-GB"/>
           </a:p>
@@ -1526,7 +1715,7 @@
             <a:fld id="{FD48FB5F-08CF-4C15-A255-EF5626F26EBD}" type="datetimeFigureOut">
               <a:rPr lang="en-GB" smtClean="0"/>
               <a:pPr/>
-              <a:t>29/11/2013</a:t>
+              <a:t>11/12/2013</a:t>
             </a:fld>
             <a:endParaRPr lang="en-GB"/>
           </a:p>
@@ -1698,7 +1887,7 @@
             <a:fld id="{FD48FB5F-08CF-4C15-A255-EF5626F26EBD}" type="datetimeFigureOut">
               <a:rPr lang="en-GB" smtClean="0"/>
               <a:pPr/>
-              <a:t>29/11/2013</a:t>
+              <a:t>11/12/2013</a:t>
             </a:fld>
             <a:endParaRPr lang="en-GB" dirty="0"/>
           </a:p>
@@ -1956,7 +2145,7 @@
             <a:fld id="{FD48FB5F-08CF-4C15-A255-EF5626F26EBD}" type="datetimeFigureOut">
               <a:rPr lang="en-GB" smtClean="0"/>
               <a:pPr/>
-              <a:t>29/11/2013</a:t>
+              <a:t>11/12/2013</a:t>
             </a:fld>
             <a:endParaRPr lang="en-GB"/>
           </a:p>
@@ -2204,7 +2393,7 @@
             <a:fld id="{FD48FB5F-08CF-4C15-A255-EF5626F26EBD}" type="datetimeFigureOut">
               <a:rPr lang="en-GB" smtClean="0"/>
               <a:pPr/>
-              <a:t>29/11/2013</a:t>
+              <a:t>11/12/2013</a:t>
             </a:fld>
             <a:endParaRPr lang="en-GB"/>
           </a:p>
@@ -2489,7 +2678,7 @@
             <a:fld id="{FD48FB5F-08CF-4C15-A255-EF5626F26EBD}" type="datetimeFigureOut">
               <a:rPr lang="en-GB" smtClean="0"/>
               <a:pPr/>
-              <a:t>29/11/2013</a:t>
+              <a:t>11/12/2013</a:t>
             </a:fld>
             <a:endParaRPr lang="en-GB"/>
           </a:p>
@@ -2908,7 +3097,7 @@
             <a:fld id="{FD48FB5F-08CF-4C15-A255-EF5626F26EBD}" type="datetimeFigureOut">
               <a:rPr lang="en-GB" smtClean="0"/>
               <a:pPr/>
-              <a:t>29/11/2013</a:t>
+              <a:t>11/12/2013</a:t>
             </a:fld>
             <a:endParaRPr lang="en-GB"/>
           </a:p>
@@ -3023,7 +3212,7 @@
             <a:fld id="{FD48FB5F-08CF-4C15-A255-EF5626F26EBD}" type="datetimeFigureOut">
               <a:rPr lang="en-GB" smtClean="0"/>
               <a:pPr/>
-              <a:t>29/11/2013</a:t>
+              <a:t>11/12/2013</a:t>
             </a:fld>
             <a:endParaRPr lang="en-GB"/>
           </a:p>
@@ -3115,7 +3304,7 @@
             <a:fld id="{FD48FB5F-08CF-4C15-A255-EF5626F26EBD}" type="datetimeFigureOut">
               <a:rPr lang="en-GB" smtClean="0"/>
               <a:pPr/>
-              <a:t>29/11/2013</a:t>
+              <a:t>11/12/2013</a:t>
             </a:fld>
             <a:endParaRPr lang="en-GB"/>
           </a:p>
@@ -3389,7 +3578,7 @@
             <a:fld id="{FD48FB5F-08CF-4C15-A255-EF5626F26EBD}" type="datetimeFigureOut">
               <a:rPr lang="en-GB" smtClean="0"/>
               <a:pPr/>
-              <a:t>29/11/2013</a:t>
+              <a:t>11/12/2013</a:t>
             </a:fld>
             <a:endParaRPr lang="en-GB"/>
           </a:p>
@@ -3624,7 +3813,7 @@
             <a:fld id="{FD48FB5F-08CF-4C15-A255-EF5626F26EBD}" type="datetimeFigureOut">
               <a:rPr lang="en-GB" smtClean="0"/>
               <a:pPr/>
-              <a:t>29/11/2013</a:t>
+              <a:t>11/12/2013</a:t>
             </a:fld>
             <a:endParaRPr lang="en-GB"/>
           </a:p>
@@ -4135,6 +4324,107 @@
 </p:sld>
 </file>
 
+<file path=ppt/slides/slide10.xml><?xml version="1.0" encoding="utf-8"?>
+<p:sld xmlns:a="http://schemas.openxmlformats.org/drawingml/2006/main" xmlns:r="http://schemas.openxmlformats.org/officeDocument/2006/relationships" xmlns:p="http://schemas.openxmlformats.org/presentationml/2006/main">
+  <p:cSld>
+    <p:spTree>
+      <p:nvGrpSpPr>
+        <p:cNvPr id="1" name=""/>
+        <p:cNvGrpSpPr/>
+        <p:nvPr/>
+      </p:nvGrpSpPr>
+      <p:grpSpPr>
+        <a:xfrm>
+          <a:off x="0" y="0"/>
+          <a:ext cx="0" cy="0"/>
+          <a:chOff x="0" y="0"/>
+          <a:chExt cx="0" cy="0"/>
+        </a:xfrm>
+      </p:grpSpPr>
+      <p:sp>
+        <p:nvSpPr>
+          <p:cNvPr id="2" name="Title 1"/>
+          <p:cNvSpPr>
+            <a:spLocks noGrp="1"/>
+          </p:cNvSpPr>
+          <p:nvPr>
+            <p:ph type="title"/>
+          </p:nvPr>
+        </p:nvSpPr>
+        <p:spPr/>
+        <p:txBody>
+          <a:bodyPr/>
+          <a:lstStyle/>
+          <a:p>
+            <a:r>
+              <a:rPr lang="en-US" dirty="0" smtClean="0"/>
+              <a:t>References</a:t>
+            </a:r>
+            <a:endParaRPr lang="en-GB" dirty="0"/>
+          </a:p>
+        </p:txBody>
+      </p:sp>
+      <p:sp>
+        <p:nvSpPr>
+          <p:cNvPr id="3" name="Content Placeholder 2"/>
+          <p:cNvSpPr>
+            <a:spLocks noGrp="1"/>
+          </p:cNvSpPr>
+          <p:nvPr>
+            <p:ph idx="1"/>
+          </p:nvPr>
+        </p:nvSpPr>
+        <p:spPr/>
+        <p:txBody>
+          <a:bodyPr/>
+          <a:lstStyle/>
+          <a:p>
+            <a:r>
+              <a:rPr lang="en-GB" dirty="0" smtClean="0">
+                <a:hlinkClick r:id="rId2"/>
+              </a:rPr>
+              <a:t>http://www.math.com/students/wonders/life/life.html</a:t>
+            </a:r>
+            <a:endParaRPr lang="en-GB" dirty="0" smtClean="0"/>
+          </a:p>
+          <a:p>
+            <a:r>
+              <a:rPr lang="en-GB" dirty="0" smtClean="0">
+                <a:hlinkClick r:id="rId3"/>
+              </a:rPr>
+              <a:t>http://en.wikipedia.org/wiki/Conway%27s_Game_of_Life</a:t>
+            </a:r>
+            <a:endParaRPr lang="en-GB" dirty="0" smtClean="0"/>
+          </a:p>
+          <a:p>
+            <a:r>
+              <a:rPr lang="en-GB" dirty="0" smtClean="0">
+                <a:hlinkClick r:id="rId4"/>
+              </a:rPr>
+              <a:t>http://www.julianpulgarin.com/canvaslife/</a:t>
+            </a:r>
+            <a:endParaRPr lang="en-GB" dirty="0" smtClean="0"/>
+          </a:p>
+          <a:p>
+            <a:endParaRPr lang="en-GB" dirty="0"/>
+          </a:p>
+        </p:txBody>
+      </p:sp>
+    </p:spTree>
+  </p:cSld>
+  <p:clrMapOvr>
+    <a:masterClrMapping/>
+  </p:clrMapOvr>
+  <p:timing>
+    <p:tnLst>
+      <p:par>
+        <p:cTn id="1" dur="indefinite" restart="never" nodeType="tmRoot"/>
+      </p:par>
+    </p:tnLst>
+  </p:timing>
+</p:sld>
+</file>
+
 <file path=ppt/slides/slide2.xml><?xml version="1.0" encoding="utf-8"?>
 <p:sld xmlns:a="http://schemas.openxmlformats.org/drawingml/2006/main" xmlns:r="http://schemas.openxmlformats.org/officeDocument/2006/relationships" xmlns:p="http://schemas.openxmlformats.org/presentationml/2006/main">
   <p:cSld>
@@ -4169,7 +4459,7 @@
           <a:p>
             <a:r>
               <a:rPr lang="en-US" dirty="0" smtClean="0"/>
-              <a:t>Cellular Automata</a:t>
+              <a:t>Task</a:t>
             </a:r>
             <a:endParaRPr lang="en-GB" dirty="0"/>
           </a:p>
@@ -4187,28 +4477,91 @@
         </p:nvSpPr>
         <p:spPr/>
         <p:txBody>
-          <a:bodyPr/>
-          <a:lstStyle/>
+          <a:bodyPr>
+            <a:normAutofit lnSpcReduction="10000"/>
+          </a:bodyPr>
+          <a:lstStyle/>
+          <a:p>
+            <a:r>
+              <a:rPr lang="en-GB" b="1" dirty="0" smtClean="0"/>
+              <a:t>Create interactive </a:t>
+            </a:r>
+            <a:r>
+              <a:rPr lang="en-GB" b="1" dirty="0" smtClean="0"/>
+              <a:t>implementation of </a:t>
+            </a:r>
+            <a:r>
+              <a:rPr lang="en-GB" b="1" dirty="0" smtClean="0"/>
+              <a:t>Conway’s Game </a:t>
+            </a:r>
+            <a:r>
+              <a:rPr lang="en-GB" b="1" dirty="0" smtClean="0"/>
+              <a:t>of Life </a:t>
+            </a:r>
+            <a:endParaRPr lang="en-GB" b="1" dirty="0" smtClean="0"/>
+          </a:p>
           <a:p>
             <a:r>
               <a:rPr lang="en-US" dirty="0" smtClean="0"/>
-              <a:t>Period</a:t>
-            </a:r>
-          </a:p>
-          <a:p>
+              <a:t>User selects starting point for blinkers</a:t>
+            </a:r>
+          </a:p>
+          <a:p>
+            <a:r>
+              <a:rPr lang="en-GB" dirty="0" smtClean="0"/>
+              <a:t>System </a:t>
+            </a:r>
+            <a:r>
+              <a:rPr lang="en-GB" dirty="0" smtClean="0"/>
+              <a:t>then sends </a:t>
+            </a:r>
+            <a:r>
+              <a:rPr lang="en-GB" dirty="0" smtClean="0"/>
+              <a:t>gliders to destroy blinkers</a:t>
+            </a:r>
+          </a:p>
+          <a:p>
+            <a:pPr>
+              <a:buNone/>
+            </a:pPr>
             <a:r>
               <a:rPr lang="en-US" dirty="0" smtClean="0"/>
-              <a:t>Speed</a:t>
+              <a:t>OR</a:t>
+            </a:r>
+          </a:p>
+          <a:p>
+            <a:r>
+              <a:rPr lang="en-GB" dirty="0" smtClean="0"/>
+              <a:t>System </a:t>
+            </a:r>
+            <a:r>
+              <a:rPr lang="en-GB" dirty="0" smtClean="0"/>
+              <a:t>randomly sets </a:t>
+            </a:r>
+            <a:r>
+              <a:rPr lang="en-GB" dirty="0" smtClean="0"/>
+              <a:t>blinkers</a:t>
+            </a:r>
+          </a:p>
+          <a:p>
+            <a:r>
+              <a:rPr lang="en-GB" dirty="0" smtClean="0"/>
+              <a:t>Player </a:t>
+            </a:r>
+            <a:r>
+              <a:rPr lang="en-GB" dirty="0" smtClean="0"/>
+              <a:t>sets starting point for </a:t>
+            </a:r>
+            <a:r>
+              <a:rPr lang="en-GB" dirty="0" smtClean="0"/>
+              <a:t>gliders</a:t>
             </a:r>
           </a:p>
           <a:p>
             <a:r>
               <a:rPr lang="en-US" dirty="0" smtClean="0"/>
-              <a:t>Rules</a:t>
-            </a:r>
-            <a:endParaRPr lang="en-GB" dirty="0" smtClean="0"/>
-          </a:p>
-          <a:p>
+              <a:t>System sends gliders from starting point</a:t>
+            </a:r>
             <a:endParaRPr lang="en-GB" dirty="0"/>
           </a:p>
         </p:txBody>
@@ -4222,6 +4575,98 @@
 </file>
 
 <file path=ppt/slides/slide3.xml><?xml version="1.0" encoding="utf-8"?>
+<p:sld xmlns:a="http://schemas.openxmlformats.org/drawingml/2006/main" xmlns:r="http://schemas.openxmlformats.org/officeDocument/2006/relationships" xmlns:p="http://schemas.openxmlformats.org/presentationml/2006/main">
+  <p:cSld>
+    <p:spTree>
+      <p:nvGrpSpPr>
+        <p:cNvPr id="1" name=""/>
+        <p:cNvGrpSpPr/>
+        <p:nvPr/>
+      </p:nvGrpSpPr>
+      <p:grpSpPr>
+        <a:xfrm>
+          <a:off x="0" y="0"/>
+          <a:ext cx="0" cy="0"/>
+          <a:chOff x="0" y="0"/>
+          <a:chExt cx="0" cy="0"/>
+        </a:xfrm>
+      </p:grpSpPr>
+      <p:sp>
+        <p:nvSpPr>
+          <p:cNvPr id="2" name="Title 1"/>
+          <p:cNvSpPr>
+            <a:spLocks noGrp="1"/>
+          </p:cNvSpPr>
+          <p:nvPr>
+            <p:ph type="title"/>
+          </p:nvPr>
+        </p:nvSpPr>
+        <p:spPr/>
+        <p:txBody>
+          <a:bodyPr/>
+          <a:lstStyle/>
+          <a:p>
+            <a:r>
+              <a:rPr lang="en-US" dirty="0" smtClean="0"/>
+              <a:t>Cellular Automata</a:t>
+            </a:r>
+            <a:endParaRPr lang="en-GB" dirty="0"/>
+          </a:p>
+        </p:txBody>
+      </p:sp>
+      <p:sp>
+        <p:nvSpPr>
+          <p:cNvPr id="3" name="Content Placeholder 2"/>
+          <p:cNvSpPr>
+            <a:spLocks noGrp="1"/>
+          </p:cNvSpPr>
+          <p:nvPr>
+            <p:ph idx="1"/>
+          </p:nvPr>
+        </p:nvSpPr>
+        <p:spPr/>
+        <p:txBody>
+          <a:bodyPr/>
+          <a:lstStyle/>
+          <a:p>
+            <a:r>
+              <a:rPr lang="en-US" dirty="0" smtClean="0"/>
+              <a:t>Emergence</a:t>
+            </a:r>
+          </a:p>
+          <a:p>
+            <a:r>
+              <a:rPr lang="en-US" dirty="0" smtClean="0"/>
+              <a:t>Period</a:t>
+            </a:r>
+          </a:p>
+          <a:p>
+            <a:r>
+              <a:rPr lang="en-US" dirty="0" smtClean="0"/>
+              <a:t>Speed</a:t>
+            </a:r>
+          </a:p>
+          <a:p>
+            <a:r>
+              <a:rPr lang="en-US" dirty="0" smtClean="0"/>
+              <a:t>Rules</a:t>
+            </a:r>
+            <a:endParaRPr lang="en-GB" dirty="0" smtClean="0"/>
+          </a:p>
+          <a:p>
+            <a:endParaRPr lang="en-GB" dirty="0"/>
+          </a:p>
+        </p:txBody>
+      </p:sp>
+    </p:spTree>
+  </p:cSld>
+  <p:clrMapOvr>
+    <a:masterClrMapping/>
+  </p:clrMapOvr>
+</p:sld>
+</file>
+
+<file path=ppt/slides/slide4.xml><?xml version="1.0" encoding="utf-8"?>
 <p:sld xmlns:a="http://schemas.openxmlformats.org/drawingml/2006/main" xmlns:r="http://schemas.openxmlformats.org/officeDocument/2006/relationships" xmlns:p="http://schemas.openxmlformats.org/presentationml/2006/main">
   <p:cSld>
     <p:spTree>
@@ -4387,7 +4832,7 @@
 </p:sld>
 </file>
 
-<file path=ppt/slides/slide4.xml><?xml version="1.0" encoding="utf-8"?>
+<file path=ppt/slides/slide5.xml><?xml version="1.0" encoding="utf-8"?>
 <p:sld xmlns:a="http://schemas.openxmlformats.org/drawingml/2006/main" xmlns:r="http://schemas.openxmlformats.org/officeDocument/2006/relationships" xmlns:p="http://schemas.openxmlformats.org/presentationml/2006/main">
   <p:cSld>
     <p:spTree>
@@ -4749,7 +5194,7 @@
 </p:sld>
 </file>
 
-<file path=ppt/slides/slide5.xml><?xml version="1.0" encoding="utf-8"?>
+<file path=ppt/slides/slide6.xml><?xml version="1.0" encoding="utf-8"?>
 <p:sld xmlns:a="http://schemas.openxmlformats.org/drawingml/2006/main" xmlns:r="http://schemas.openxmlformats.org/officeDocument/2006/relationships" xmlns:p="http://schemas.openxmlformats.org/presentationml/2006/main">
   <p:cSld>
     <p:spTree>
@@ -5089,80 +5534,6 @@
 </p:sld>
 </file>
 
-<file path=ppt/slides/slide6.xml><?xml version="1.0" encoding="utf-8"?>
-<p:sld xmlns:a="http://schemas.openxmlformats.org/drawingml/2006/main" xmlns:r="http://schemas.openxmlformats.org/officeDocument/2006/relationships" xmlns:p="http://schemas.openxmlformats.org/presentationml/2006/main">
-  <p:cSld>
-    <p:spTree>
-      <p:nvGrpSpPr>
-        <p:cNvPr id="1" name=""/>
-        <p:cNvGrpSpPr/>
-        <p:nvPr/>
-      </p:nvGrpSpPr>
-      <p:grpSpPr>
-        <a:xfrm>
-          <a:off x="0" y="0"/>
-          <a:ext cx="0" cy="0"/>
-          <a:chOff x="0" y="0"/>
-          <a:chExt cx="0" cy="0"/>
-        </a:xfrm>
-      </p:grpSpPr>
-      <p:sp>
-        <p:nvSpPr>
-          <p:cNvPr id="2" name="Title 1"/>
-          <p:cNvSpPr>
-            <a:spLocks noGrp="1"/>
-          </p:cNvSpPr>
-          <p:nvPr>
-            <p:ph type="title"/>
-          </p:nvPr>
-        </p:nvSpPr>
-        <p:spPr/>
-        <p:txBody>
-          <a:bodyPr/>
-          <a:lstStyle/>
-          <a:p>
-            <a:r>
-              <a:rPr lang="en-US" dirty="0" smtClean="0"/>
-              <a:t>Algorithm</a:t>
-            </a:r>
-            <a:endParaRPr lang="en-GB" dirty="0"/>
-          </a:p>
-        </p:txBody>
-      </p:sp>
-      <p:sp>
-        <p:nvSpPr>
-          <p:cNvPr id="3" name="Content Placeholder 2"/>
-          <p:cNvSpPr>
-            <a:spLocks noGrp="1"/>
-          </p:cNvSpPr>
-          <p:nvPr>
-            <p:ph idx="1"/>
-          </p:nvPr>
-        </p:nvSpPr>
-        <p:spPr/>
-        <p:txBody>
-          <a:bodyPr/>
-          <a:lstStyle/>
-          <a:p>
-            <a:endParaRPr lang="en-GB"/>
-          </a:p>
-        </p:txBody>
-      </p:sp>
-    </p:spTree>
-  </p:cSld>
-  <p:clrMapOvr>
-    <a:masterClrMapping/>
-  </p:clrMapOvr>
-  <p:timing>
-    <p:tnLst>
-      <p:par>
-        <p:cTn id="1" dur="indefinite" restart="never" nodeType="tmRoot"/>
-      </p:par>
-    </p:tnLst>
-  </p:timing>
-</p:sld>
-</file>
-
 <file path=ppt/slides/slide7.xml><?xml version="1.0" encoding="utf-8"?>
 <p:sld xmlns:a="http://schemas.openxmlformats.org/drawingml/2006/main" xmlns:r="http://schemas.openxmlformats.org/officeDocument/2006/relationships" xmlns:p="http://schemas.openxmlformats.org/presentationml/2006/main">
   <p:cSld>
@@ -5197,7 +5568,7 @@
           <a:p>
             <a:r>
               <a:rPr lang="en-US" dirty="0" smtClean="0"/>
-              <a:t>Thank you for your attention!</a:t>
+              <a:t>Algorithm (1)</a:t>
             </a:r>
             <a:endParaRPr lang="en-GB" dirty="0"/>
           </a:p>
@@ -5218,7 +5589,7 @@
           <a:bodyPr/>
           <a:lstStyle/>
           <a:p>
-            <a:endParaRPr lang="en-GB"/>
+            <a:endParaRPr lang="en-GB" dirty="0"/>
           </a:p>
         </p:txBody>
       </p:sp>
@@ -5271,7 +5642,11 @@
           <a:p>
             <a:r>
               <a:rPr lang="en-US" dirty="0" smtClean="0"/>
-              <a:t>References</a:t>
+              <a:t>Algorithm </a:t>
+            </a:r>
+            <a:r>
+              <a:rPr lang="en-US" dirty="0" smtClean="0"/>
+              <a:t>(2)</a:t>
             </a:r>
             <a:endParaRPr lang="en-GB" dirty="0"/>
           </a:p>
@@ -5292,33 +5667,77 @@
           <a:bodyPr/>
           <a:lstStyle/>
           <a:p>
-            <a:r>
-              <a:rPr lang="en-GB" dirty="0" smtClean="0">
-                <a:hlinkClick r:id="rId2"/>
-              </a:rPr>
-              <a:t>http://www.math.com/students/wonders/life/life.html</a:t>
-            </a:r>
-            <a:endParaRPr lang="en-GB" dirty="0" smtClean="0"/>
-          </a:p>
-          <a:p>
-            <a:r>
-              <a:rPr lang="en-GB" dirty="0" smtClean="0">
-                <a:hlinkClick r:id="rId3"/>
-              </a:rPr>
-              <a:t>http://en.wikipedia.org/wiki/Conway%27s_Game_of_Life</a:t>
-            </a:r>
-            <a:endParaRPr lang="en-GB" dirty="0" smtClean="0"/>
-          </a:p>
-          <a:p>
-            <a:r>
-              <a:rPr lang="en-GB" dirty="0" smtClean="0">
-                <a:hlinkClick r:id="rId4"/>
-              </a:rPr>
-              <a:t>http://www.julianpulgarin.com/canvaslife/</a:t>
-            </a:r>
-            <a:endParaRPr lang="en-GB" dirty="0" smtClean="0"/>
-          </a:p>
-          <a:p>
+            <a:endParaRPr lang="en-GB"/>
+          </a:p>
+        </p:txBody>
+      </p:sp>
+    </p:spTree>
+  </p:cSld>
+  <p:clrMapOvr>
+    <a:masterClrMapping/>
+  </p:clrMapOvr>
+</p:sld>
+</file>
+
+<file path=ppt/slides/slide9.xml><?xml version="1.0" encoding="utf-8"?>
+<p:sld xmlns:a="http://schemas.openxmlformats.org/drawingml/2006/main" xmlns:r="http://schemas.openxmlformats.org/officeDocument/2006/relationships" xmlns:p="http://schemas.openxmlformats.org/presentationml/2006/main">
+  <p:cSld>
+    <p:spTree>
+      <p:nvGrpSpPr>
+        <p:cNvPr id="1" name=""/>
+        <p:cNvGrpSpPr/>
+        <p:nvPr/>
+      </p:nvGrpSpPr>
+      <p:grpSpPr>
+        <a:xfrm>
+          <a:off x="0" y="0"/>
+          <a:ext cx="0" cy="0"/>
+          <a:chOff x="0" y="0"/>
+          <a:chExt cx="0" cy="0"/>
+        </a:xfrm>
+      </p:grpSpPr>
+      <p:sp>
+        <p:nvSpPr>
+          <p:cNvPr id="2" name="Title 1"/>
+          <p:cNvSpPr>
+            <a:spLocks noGrp="1"/>
+          </p:cNvSpPr>
+          <p:nvPr>
+            <p:ph type="title"/>
+          </p:nvPr>
+        </p:nvSpPr>
+        <p:spPr/>
+        <p:txBody>
+          <a:bodyPr/>
+          <a:lstStyle/>
+          <a:p>
+            <a:r>
+              <a:rPr lang="en-US" dirty="0" smtClean="0"/>
+              <a:t>Thank you for your attention!</a:t>
+            </a:r>
+            <a:endParaRPr lang="en-GB" dirty="0"/>
+          </a:p>
+        </p:txBody>
+      </p:sp>
+      <p:sp>
+        <p:nvSpPr>
+          <p:cNvPr id="3" name="Content Placeholder 2"/>
+          <p:cNvSpPr>
+            <a:spLocks noGrp="1"/>
+          </p:cNvSpPr>
+          <p:nvPr>
+            <p:ph idx="1"/>
+          </p:nvPr>
+        </p:nvSpPr>
+        <p:spPr/>
+        <p:txBody>
+          <a:bodyPr/>
+          <a:lstStyle/>
+          <a:p>
+            <a:r>
+              <a:rPr lang="en-US" dirty="0" smtClean="0"/>
+              <a:t>Do you have any questions ?</a:t>
+            </a:r>
             <a:endParaRPr lang="en-GB" dirty="0"/>
           </a:p>
         </p:txBody>

</xml_diff>

<commit_message>
Ver 2.0   On branch CleanWebsite   Changes to be committed:  	modified:   Conway's Game of Life.pptx  	modified:   GoL.v11.suo  	modified:   Scripts/GoL.js   Done: 	Implemented algorithm to get closest 	organism to starting point, + glider 	and Small Fish rotation.   ToDo: 	Repair canvas resizing. 	Repair Pattern loading.
</commit_message>
<xml_diff>
--- a/Conway's Game of Life.pptx
+++ b/Conway's Game of Life.pptx
@@ -202,7 +202,7 @@
             <a:fld id="{021F6B4D-F637-4364-9B64-02E2D6AD5AEE}" type="datetimeFigureOut">
               <a:rPr lang="en-GB" smtClean="0"/>
               <a:pPr/>
-              <a:t>11/12/2013</a:t>
+              <a:t>13/12/2013</a:t>
             </a:fld>
             <a:endParaRPr lang="en-GB"/>
           </a:p>
@@ -792,8 +792,31 @@
           <a:lstStyle/>
           <a:p>
             <a:r>
+              <a:rPr lang="en-US" dirty="0" smtClean="0"/>
+              <a:t>Why Conway’s Game of life is Artificial Intelligence ? Because </a:t>
+            </a:r>
+            <a:r>
+              <a:rPr lang="en-US" smtClean="0"/>
+              <a:t>it uses </a:t>
+            </a:r>
+            <a:r>
+              <a:rPr lang="en-US" dirty="0" smtClean="0"/>
+              <a:t>these three simple rules</a:t>
+            </a:r>
+            <a:r>
+              <a:rPr lang="en-US" baseline="0" dirty="0" smtClean="0"/>
+              <a:t> of life.</a:t>
+            </a:r>
+            <a:endParaRPr lang="en-GB" dirty="0" smtClean="0"/>
+          </a:p>
+          <a:p>
+            <a:r>
               <a:rPr lang="en-GB" dirty="0" smtClean="0"/>
-              <a:t>A dead cell with exactly three live neighbours becomes a live cell (birth).</a:t>
+              <a:t>A </a:t>
+            </a:r>
+            <a:r>
+              <a:rPr lang="en-GB" dirty="0" smtClean="0"/>
+              <a:t>dead cell with exactly three live neighbours becomes a live cell (birth).</a:t>
             </a:r>
           </a:p>
           <a:p>
@@ -897,13 +920,70 @@
             </a:r>
             <a:r>
               <a:rPr lang="en-US" baseline="0" dirty="0" smtClean="0"/>
-              <a:t> of </a:t>
-            </a:r>
-            <a:r>
-              <a:rPr lang="en-US" baseline="0" smtClean="0"/>
-              <a:t>the solution</a:t>
-            </a:r>
-            <a:endParaRPr lang="en-GB"/>
+              <a:t> of the solution …</a:t>
+            </a:r>
+          </a:p>
+          <a:p>
+            <a:r>
+              <a:rPr lang="en-US" b="1" baseline="0" dirty="0" err="1" smtClean="0"/>
+              <a:t>NextGen</a:t>
+            </a:r>
+            <a:endParaRPr lang="en-US" b="1" baseline="0" dirty="0" smtClean="0"/>
+          </a:p>
+          <a:p>
+            <a:r>
+              <a:rPr lang="en-GB" sz="1200" b="0" i="0" kern="1200" dirty="0" smtClean="0">
+                <a:solidFill>
+                  <a:schemeClr val="tx1"/>
+                </a:solidFill>
+                <a:latin typeface="+mn-lt"/>
+                <a:ea typeface="+mn-ea"/>
+                <a:cs typeface="+mn-cs"/>
+              </a:rPr>
+              <a:t> Life patterns  are represented as two-dimensional arrays in computer memory. Typically two arrays are used, one to hold the current generation, and one in which to calculate its successor. Often 0 and 1 represent dead and live cells respectively. A nested for-loop considers each element of the current array in turn, counting the live neighbours of each cell to decide whether the corresponding element of the successor array should be 0 or 1. The successor array is displayed. For the next iteration the arrays swap roles so that the successor array in the last iteration becomes the current array in the next iteration.</a:t>
+            </a:r>
+          </a:p>
+          <a:p>
+            <a:endParaRPr lang="en-US" sz="1200" b="0" i="0" kern="1200" dirty="0" smtClean="0">
+              <a:solidFill>
+                <a:schemeClr val="tx1"/>
+              </a:solidFill>
+              <a:latin typeface="+mn-lt"/>
+              <a:ea typeface="+mn-ea"/>
+              <a:cs typeface="+mn-cs"/>
+            </a:endParaRPr>
+          </a:p>
+          <a:p>
+            <a:pPr marL="0" marR="0" indent="0" algn="l" defTabSz="914400" rtl="0" eaLnBrk="1" fontAlgn="auto" latinLnBrk="0" hangingPunct="1">
+              <a:lnSpc>
+                <a:spcPct val="100000"/>
+              </a:lnSpc>
+              <a:spcBef>
+                <a:spcPts val="0"/>
+              </a:spcBef>
+              <a:spcAft>
+                <a:spcPts val="0"/>
+              </a:spcAft>
+              <a:buClrTx/>
+              <a:buSzTx/>
+              <a:buFontTx/>
+              <a:buNone/>
+              <a:tabLst/>
+              <a:defRPr/>
+            </a:pPr>
+            <a:r>
+              <a:rPr lang="en-GB" dirty="0" smtClean="0"/>
+              <a:t>In principle, the Life field is infinite, but computers have finite memory. This leads to problems when the active area encroaches on the border of the array. Programmers have used several strategies to address these problems. The simplest strategy is simply to assume that every cell outside the array is dead. This is easy to program, but leads to inaccurate results when the active area crosses the boundary. A more sophisticated trick is to consider the left and right edges of the field to be stitched together, and the top and bottom edges also, yielding a </a:t>
+            </a:r>
+            <a:r>
+              <a:rPr lang="en-GB" dirty="0" err="1" smtClean="0"/>
+              <a:t>toroidal</a:t>
+            </a:r>
+            <a:r>
+              <a:rPr lang="en-GB" dirty="0" smtClean="0"/>
+              <a:t> array. The result is that active areas that move across a field edge reappear at the opposite edge. Inaccuracy can still result if the pattern grows too large, but at least there are no pathological edge effects. Techniques of dynamic storage allocation may also be used, creating ever-larger arrays to hold growing patterns.</a:t>
+            </a:r>
+            <a:endParaRPr lang="en-GB" dirty="0"/>
           </a:p>
         </p:txBody>
       </p:sp>
@@ -1121,7 +1201,7 @@
             <a:fld id="{FD48FB5F-08CF-4C15-A255-EF5626F26EBD}" type="datetimeFigureOut">
               <a:rPr lang="en-GB" smtClean="0"/>
               <a:pPr/>
-              <a:t>11/12/2013</a:t>
+              <a:t>13/12/2013</a:t>
             </a:fld>
             <a:endParaRPr lang="en-GB"/>
           </a:p>
@@ -1371,7 +1451,7 @@
             <a:fld id="{FD48FB5F-08CF-4C15-A255-EF5626F26EBD}" type="datetimeFigureOut">
               <a:rPr lang="en-GB" smtClean="0"/>
               <a:pPr/>
-              <a:t>11/12/2013</a:t>
+              <a:t>13/12/2013</a:t>
             </a:fld>
             <a:endParaRPr lang="en-GB"/>
           </a:p>
@@ -1538,7 +1618,7 @@
             <a:fld id="{FD48FB5F-08CF-4C15-A255-EF5626F26EBD}" type="datetimeFigureOut">
               <a:rPr lang="en-GB" smtClean="0"/>
               <a:pPr/>
-              <a:t>11/12/2013</a:t>
+              <a:t>13/12/2013</a:t>
             </a:fld>
             <a:endParaRPr lang="en-GB"/>
           </a:p>
@@ -1715,7 +1795,7 @@
             <a:fld id="{FD48FB5F-08CF-4C15-A255-EF5626F26EBD}" type="datetimeFigureOut">
               <a:rPr lang="en-GB" smtClean="0"/>
               <a:pPr/>
-              <a:t>11/12/2013</a:t>
+              <a:t>13/12/2013</a:t>
             </a:fld>
             <a:endParaRPr lang="en-GB"/>
           </a:p>
@@ -1887,7 +1967,7 @@
             <a:fld id="{FD48FB5F-08CF-4C15-A255-EF5626F26EBD}" type="datetimeFigureOut">
               <a:rPr lang="en-GB" smtClean="0"/>
               <a:pPr/>
-              <a:t>11/12/2013</a:t>
+              <a:t>13/12/2013</a:t>
             </a:fld>
             <a:endParaRPr lang="en-GB" dirty="0"/>
           </a:p>
@@ -2145,7 +2225,7 @@
             <a:fld id="{FD48FB5F-08CF-4C15-A255-EF5626F26EBD}" type="datetimeFigureOut">
               <a:rPr lang="en-GB" smtClean="0"/>
               <a:pPr/>
-              <a:t>11/12/2013</a:t>
+              <a:t>13/12/2013</a:t>
             </a:fld>
             <a:endParaRPr lang="en-GB"/>
           </a:p>
@@ -2393,7 +2473,7 @@
             <a:fld id="{FD48FB5F-08CF-4C15-A255-EF5626F26EBD}" type="datetimeFigureOut">
               <a:rPr lang="en-GB" smtClean="0"/>
               <a:pPr/>
-              <a:t>11/12/2013</a:t>
+              <a:t>13/12/2013</a:t>
             </a:fld>
             <a:endParaRPr lang="en-GB"/>
           </a:p>
@@ -2678,7 +2758,7 @@
             <a:fld id="{FD48FB5F-08CF-4C15-A255-EF5626F26EBD}" type="datetimeFigureOut">
               <a:rPr lang="en-GB" smtClean="0"/>
               <a:pPr/>
-              <a:t>11/12/2013</a:t>
+              <a:t>13/12/2013</a:t>
             </a:fld>
             <a:endParaRPr lang="en-GB"/>
           </a:p>
@@ -3097,7 +3177,7 @@
             <a:fld id="{FD48FB5F-08CF-4C15-A255-EF5626F26EBD}" type="datetimeFigureOut">
               <a:rPr lang="en-GB" smtClean="0"/>
               <a:pPr/>
-              <a:t>11/12/2013</a:t>
+              <a:t>13/12/2013</a:t>
             </a:fld>
             <a:endParaRPr lang="en-GB"/>
           </a:p>
@@ -3212,7 +3292,7 @@
             <a:fld id="{FD48FB5F-08CF-4C15-A255-EF5626F26EBD}" type="datetimeFigureOut">
               <a:rPr lang="en-GB" smtClean="0"/>
               <a:pPr/>
-              <a:t>11/12/2013</a:t>
+              <a:t>13/12/2013</a:t>
             </a:fld>
             <a:endParaRPr lang="en-GB"/>
           </a:p>
@@ -3304,7 +3384,7 @@
             <a:fld id="{FD48FB5F-08CF-4C15-A255-EF5626F26EBD}" type="datetimeFigureOut">
               <a:rPr lang="en-GB" smtClean="0"/>
               <a:pPr/>
-              <a:t>11/12/2013</a:t>
+              <a:t>13/12/2013</a:t>
             </a:fld>
             <a:endParaRPr lang="en-GB"/>
           </a:p>
@@ -3578,7 +3658,7 @@
             <a:fld id="{FD48FB5F-08CF-4C15-A255-EF5626F26EBD}" type="datetimeFigureOut">
               <a:rPr lang="en-GB" smtClean="0"/>
               <a:pPr/>
-              <a:t>11/12/2013</a:t>
+              <a:t>13/12/2013</a:t>
             </a:fld>
             <a:endParaRPr lang="en-GB"/>
           </a:p>
@@ -3813,7 +3893,7 @@
             <a:fld id="{FD48FB5F-08CF-4C15-A255-EF5626F26EBD}" type="datetimeFigureOut">
               <a:rPr lang="en-GB" smtClean="0"/>
               <a:pPr/>
-              <a:t>11/12/2013</a:t>
+              <a:t>13/12/2013</a:t>
             </a:fld>
             <a:endParaRPr lang="en-GB"/>
           </a:p>
@@ -4484,21 +4564,8 @@
           <a:p>
             <a:r>
               <a:rPr lang="en-GB" b="1" dirty="0" smtClean="0"/>
-              <a:t>Create interactive </a:t>
-            </a:r>
-            <a:r>
-              <a:rPr lang="en-GB" b="1" dirty="0" smtClean="0"/>
-              <a:t>implementation of </a:t>
-            </a:r>
-            <a:r>
-              <a:rPr lang="en-GB" b="1" dirty="0" smtClean="0"/>
-              <a:t>Conway’s Game </a:t>
-            </a:r>
-            <a:r>
-              <a:rPr lang="en-GB" b="1" dirty="0" smtClean="0"/>
-              <a:t>of Life </a:t>
-            </a:r>
-            <a:endParaRPr lang="en-GB" b="1" dirty="0" smtClean="0"/>
+              <a:t>Create interactive implementation of Conway’s Game of Life </a:t>
+            </a:r>
           </a:p>
           <a:p>
             <a:r>
@@ -4509,15 +4576,7 @@
           <a:p>
             <a:r>
               <a:rPr lang="en-GB" dirty="0" smtClean="0"/>
-              <a:t>System </a:t>
-            </a:r>
-            <a:r>
-              <a:rPr lang="en-GB" dirty="0" smtClean="0"/>
-              <a:t>then sends </a:t>
-            </a:r>
-            <a:r>
-              <a:rPr lang="en-GB" dirty="0" smtClean="0"/>
-              <a:t>gliders to destroy blinkers</a:t>
+              <a:t>System then sends gliders to destroy blinkers</a:t>
             </a:r>
           </a:p>
           <a:p>
@@ -4532,29 +4591,13 @@
           <a:p>
             <a:r>
               <a:rPr lang="en-GB" dirty="0" smtClean="0"/>
-              <a:t>System </a:t>
-            </a:r>
+              <a:t>System randomly sets blinkers</a:t>
+            </a:r>
+          </a:p>
+          <a:p>
             <a:r>
               <a:rPr lang="en-GB" dirty="0" smtClean="0"/>
-              <a:t>randomly sets </a:t>
-            </a:r>
-            <a:r>
-              <a:rPr lang="en-GB" dirty="0" smtClean="0"/>
-              <a:t>blinkers</a:t>
-            </a:r>
-          </a:p>
-          <a:p>
-            <a:r>
-              <a:rPr lang="en-GB" dirty="0" smtClean="0"/>
-              <a:t>Player </a:t>
-            </a:r>
-            <a:r>
-              <a:rPr lang="en-GB" dirty="0" smtClean="0"/>
-              <a:t>sets starting point for </a:t>
-            </a:r>
-            <a:r>
-              <a:rPr lang="en-GB" dirty="0" smtClean="0"/>
-              <a:t>gliders</a:t>
+              <a:t>Player sets starting point for gliders</a:t>
             </a:r>
           </a:p>
           <a:p>
@@ -5489,8 +5532,8 @@
         </p:nvSpPr>
         <p:spPr>
           <a:xfrm>
-            <a:off x="5076056" y="5949280"/>
-            <a:ext cx="2160240" cy="646331"/>
+            <a:off x="5508104" y="6021288"/>
+            <a:ext cx="2592288" cy="646331"/>
           </a:xfrm>
           <a:prstGeom prst="rect">
             <a:avLst/>
@@ -5506,14 +5549,12 @@
           <a:lstStyle/>
           <a:p>
             <a:r>
+              <a:rPr lang="en-GB" dirty="0" smtClean="0"/>
+              <a:t>Left-handed </a:t>
+            </a:r>
+            <a:r>
               <a:rPr lang="en-US" dirty="0" smtClean="0"/>
-              <a:t>Cartesian coordinate</a:t>
-            </a:r>
-          </a:p>
-          <a:p>
-            <a:r>
-              <a:rPr lang="en-US" dirty="0" smtClean="0"/>
-              <a:t>          system</a:t>
+              <a:t>Cartesian coordinate system</a:t>
             </a:r>
             <a:endParaRPr lang="en-GB" dirty="0"/>
           </a:p>
@@ -5589,7 +5630,22 @@
           <a:bodyPr/>
           <a:lstStyle/>
           <a:p>
-            <a:endParaRPr lang="en-GB" dirty="0"/>
+            <a:r>
+              <a:rPr lang="en-GB" dirty="0" err="1" smtClean="0"/>
+              <a:t>NextGen</a:t>
+            </a:r>
+            <a:r>
+              <a:rPr lang="en-GB" dirty="0" smtClean="0"/>
+              <a:t>:  </a:t>
+            </a:r>
+            <a:r>
+              <a:rPr lang="en-GB" dirty="0" err="1" smtClean="0"/>
+              <a:t>toroidal</a:t>
+            </a:r>
+            <a:r>
+              <a:rPr lang="en-GB" dirty="0" smtClean="0"/>
+              <a:t> array</a:t>
+            </a:r>
           </a:p>
         </p:txBody>
       </p:sp>
@@ -5642,11 +5698,7 @@
           <a:p>
             <a:r>
               <a:rPr lang="en-US" dirty="0" smtClean="0"/>
-              <a:t>Algorithm </a:t>
-            </a:r>
-            <a:r>
-              <a:rPr lang="en-US" dirty="0" smtClean="0"/>
-              <a:t>(2)</a:t>
+              <a:t>Algorithm (2)</a:t>
             </a:r>
             <a:endParaRPr lang="en-GB" dirty="0"/>
           </a:p>

</xml_diff>

<commit_message>
Ver 2.1   On branch CleanWebsite   Changes to be committed:  	modified:   Content/Style.css  	modified:   Conway's Game of Life.pptx  	modified:   GoL.v11.suo  	modified:   Scripts/Controls.js  	modified:   Scripts/GoL.js  	modified:   index.html   ToDo: 	Repair pattern loading 	Cross-browser support   Done:     Changed speed controls to slider.     Repaired canvas resizing.
</commit_message>
<xml_diff>
--- a/Conway's Game of Life.pptx
+++ b/Conway's Game of Life.pptx
@@ -202,7 +202,7 @@
             <a:fld id="{021F6B4D-F637-4364-9B64-02E2D6AD5AEE}" type="datetimeFigureOut">
               <a:rPr lang="en-GB" smtClean="0"/>
               <a:pPr/>
-              <a:t>13/12/2013</a:t>
+              <a:t>19/12/2013</a:t>
             </a:fld>
             <a:endParaRPr lang="en-GB"/>
           </a:p>
@@ -812,11 +812,7 @@
           <a:p>
             <a:r>
               <a:rPr lang="en-GB" dirty="0" smtClean="0"/>
-              <a:t>A </a:t>
-            </a:r>
-            <a:r>
-              <a:rPr lang="en-GB" dirty="0" smtClean="0"/>
-              <a:t>dead cell with exactly three live neighbours becomes a live cell (birth).</a:t>
+              <a:t>A dead cell with exactly three live neighbours becomes a live cell (birth).</a:t>
             </a:r>
           </a:p>
           <a:p>
@@ -1201,7 +1197,7 @@
             <a:fld id="{FD48FB5F-08CF-4C15-A255-EF5626F26EBD}" type="datetimeFigureOut">
               <a:rPr lang="en-GB" smtClean="0"/>
               <a:pPr/>
-              <a:t>13/12/2013</a:t>
+              <a:t>19/12/2013</a:t>
             </a:fld>
             <a:endParaRPr lang="en-GB"/>
           </a:p>
@@ -1451,7 +1447,7 @@
             <a:fld id="{FD48FB5F-08CF-4C15-A255-EF5626F26EBD}" type="datetimeFigureOut">
               <a:rPr lang="en-GB" smtClean="0"/>
               <a:pPr/>
-              <a:t>13/12/2013</a:t>
+              <a:t>19/12/2013</a:t>
             </a:fld>
             <a:endParaRPr lang="en-GB"/>
           </a:p>
@@ -1618,7 +1614,7 @@
             <a:fld id="{FD48FB5F-08CF-4C15-A255-EF5626F26EBD}" type="datetimeFigureOut">
               <a:rPr lang="en-GB" smtClean="0"/>
               <a:pPr/>
-              <a:t>13/12/2013</a:t>
+              <a:t>19/12/2013</a:t>
             </a:fld>
             <a:endParaRPr lang="en-GB"/>
           </a:p>
@@ -1795,7 +1791,7 @@
             <a:fld id="{FD48FB5F-08CF-4C15-A255-EF5626F26EBD}" type="datetimeFigureOut">
               <a:rPr lang="en-GB" smtClean="0"/>
               <a:pPr/>
-              <a:t>13/12/2013</a:t>
+              <a:t>19/12/2013</a:t>
             </a:fld>
             <a:endParaRPr lang="en-GB"/>
           </a:p>
@@ -1967,7 +1963,7 @@
             <a:fld id="{FD48FB5F-08CF-4C15-A255-EF5626F26EBD}" type="datetimeFigureOut">
               <a:rPr lang="en-GB" smtClean="0"/>
               <a:pPr/>
-              <a:t>13/12/2013</a:t>
+              <a:t>19/12/2013</a:t>
             </a:fld>
             <a:endParaRPr lang="en-GB" dirty="0"/>
           </a:p>
@@ -2225,7 +2221,7 @@
             <a:fld id="{FD48FB5F-08CF-4C15-A255-EF5626F26EBD}" type="datetimeFigureOut">
               <a:rPr lang="en-GB" smtClean="0"/>
               <a:pPr/>
-              <a:t>13/12/2013</a:t>
+              <a:t>19/12/2013</a:t>
             </a:fld>
             <a:endParaRPr lang="en-GB"/>
           </a:p>
@@ -2473,7 +2469,7 @@
             <a:fld id="{FD48FB5F-08CF-4C15-A255-EF5626F26EBD}" type="datetimeFigureOut">
               <a:rPr lang="en-GB" smtClean="0"/>
               <a:pPr/>
-              <a:t>13/12/2013</a:t>
+              <a:t>19/12/2013</a:t>
             </a:fld>
             <a:endParaRPr lang="en-GB"/>
           </a:p>
@@ -2758,7 +2754,7 @@
             <a:fld id="{FD48FB5F-08CF-4C15-A255-EF5626F26EBD}" type="datetimeFigureOut">
               <a:rPr lang="en-GB" smtClean="0"/>
               <a:pPr/>
-              <a:t>13/12/2013</a:t>
+              <a:t>19/12/2013</a:t>
             </a:fld>
             <a:endParaRPr lang="en-GB"/>
           </a:p>
@@ -3177,7 +3173,7 @@
             <a:fld id="{FD48FB5F-08CF-4C15-A255-EF5626F26EBD}" type="datetimeFigureOut">
               <a:rPr lang="en-GB" smtClean="0"/>
               <a:pPr/>
-              <a:t>13/12/2013</a:t>
+              <a:t>19/12/2013</a:t>
             </a:fld>
             <a:endParaRPr lang="en-GB"/>
           </a:p>
@@ -3292,7 +3288,7 @@
             <a:fld id="{FD48FB5F-08CF-4C15-A255-EF5626F26EBD}" type="datetimeFigureOut">
               <a:rPr lang="en-GB" smtClean="0"/>
               <a:pPr/>
-              <a:t>13/12/2013</a:t>
+              <a:t>19/12/2013</a:t>
             </a:fld>
             <a:endParaRPr lang="en-GB"/>
           </a:p>
@@ -3384,7 +3380,7 @@
             <a:fld id="{FD48FB5F-08CF-4C15-A255-EF5626F26EBD}" type="datetimeFigureOut">
               <a:rPr lang="en-GB" smtClean="0"/>
               <a:pPr/>
-              <a:t>13/12/2013</a:t>
+              <a:t>19/12/2013</a:t>
             </a:fld>
             <a:endParaRPr lang="en-GB"/>
           </a:p>
@@ -3658,7 +3654,7 @@
             <a:fld id="{FD48FB5F-08CF-4C15-A255-EF5626F26EBD}" type="datetimeFigureOut">
               <a:rPr lang="en-GB" smtClean="0"/>
               <a:pPr/>
-              <a:t>13/12/2013</a:t>
+              <a:t>19/12/2013</a:t>
             </a:fld>
             <a:endParaRPr lang="en-GB"/>
           </a:p>
@@ -3893,7 +3889,7 @@
             <a:fld id="{FD48FB5F-08CF-4C15-A255-EF5626F26EBD}" type="datetimeFigureOut">
               <a:rPr lang="en-GB" smtClean="0"/>
               <a:pPr/>
-              <a:t>13/12/2013</a:t>
+              <a:t>19/12/2013</a:t>
             </a:fld>
             <a:endParaRPr lang="en-GB"/>
           </a:p>
@@ -4555,22 +4551,28 @@
             <p:ph idx="1"/>
           </p:nvPr>
         </p:nvSpPr>
-        <p:spPr/>
+        <p:spPr>
+          <a:xfrm>
+            <a:off x="457200" y="2492896"/>
+            <a:ext cx="8229600" cy="3633267"/>
+          </a:xfrm>
+          <a:ln w="3175">
+            <a:noFill/>
+          </a:ln>
+        </p:spPr>
         <p:txBody>
           <a:bodyPr>
-            <a:normAutofit lnSpcReduction="10000"/>
+            <a:normAutofit/>
           </a:bodyPr>
           <a:lstStyle/>
           <a:p>
             <a:r>
-              <a:rPr lang="en-GB" b="1" dirty="0" smtClean="0"/>
-              <a:t>Create interactive implementation of Conway’s Game of Life </a:t>
-            </a:r>
-          </a:p>
-          <a:p>
-            <a:r>
               <a:rPr lang="en-US" dirty="0" smtClean="0"/>
-              <a:t>User selects starting point for blinkers</a:t>
+              <a:t>User </a:t>
+            </a:r>
+            <a:r>
+              <a:rPr lang="en-US" dirty="0" smtClean="0"/>
+              <a:t>selects starting point for blinkers</a:t>
             </a:r>
           </a:p>
           <a:p>
@@ -4606,6 +4608,70 @@
               <a:t>System sends gliders from starting point</a:t>
             </a:r>
             <a:endParaRPr lang="en-GB" dirty="0"/>
+          </a:p>
+        </p:txBody>
+      </p:sp>
+      <p:sp>
+        <p:nvSpPr>
+          <p:cNvPr id="4" name="TextBox 3"/>
+          <p:cNvSpPr txBox="1"/>
+          <p:nvPr/>
+        </p:nvSpPr>
+        <p:spPr>
+          <a:xfrm>
+            <a:off x="611560" y="1271662"/>
+            <a:ext cx="7848872" cy="1077218"/>
+          </a:xfrm>
+          <a:prstGeom prst="rect">
+            <a:avLst/>
+          </a:prstGeom>
+          <a:noFill/>
+          <a:ln cmpd="thickThin">
+            <a:solidFill>
+              <a:schemeClr val="tx2">
+                <a:lumMod val="75000"/>
+              </a:schemeClr>
+            </a:solidFill>
+            <a:prstDash val="sysDot"/>
+          </a:ln>
+          <a:effectLst>
+            <a:outerShdw blurRad="1270000" dist="622300" sx="70000" sy="70000" algn="ctr" rotWithShape="0">
+              <a:srgbClr val="000000">
+                <a:alpha val="32000"/>
+              </a:srgbClr>
+            </a:outerShdw>
+          </a:effectLst>
+        </p:spPr>
+        <p:txBody>
+          <a:bodyPr wrap="square" rtlCol="0">
+            <a:spAutoFit/>
+          </a:bodyPr>
+          <a:lstStyle/>
+          <a:p>
+            <a:pPr marL="274638"/>
+            <a:r>
+              <a:rPr lang="en-GB" sz="3200" b="1" dirty="0" smtClean="0"/>
+              <a:t>Create </a:t>
+            </a:r>
+            <a:r>
+              <a:rPr lang="en-GB" sz="3200" b="1" dirty="0" smtClean="0"/>
+              <a:t>interactive implementation </a:t>
+            </a:r>
+            <a:r>
+              <a:rPr lang="en-GB" sz="3200" b="1" dirty="0" smtClean="0"/>
+              <a:t>of</a:t>
+            </a:r>
+          </a:p>
+          <a:p>
+            <a:pPr marL="274638"/>
+            <a:r>
+              <a:rPr lang="en-GB" sz="3200" b="1" dirty="0" smtClean="0"/>
+              <a:t>Conway’s </a:t>
+            </a:r>
+            <a:r>
+              <a:rPr lang="en-GB" sz="3200" b="1" dirty="0" smtClean="0"/>
+              <a:t>Game of Life </a:t>
+            </a:r>
           </a:p>
         </p:txBody>
       </p:sp>
@@ -4693,6 +4759,12 @@
             <a:r>
               <a:rPr lang="en-US" dirty="0" smtClean="0"/>
               <a:t>Rules</a:t>
+            </a:r>
+          </a:p>
+          <a:p>
+            <a:r>
+              <a:rPr lang="en-US" smtClean="0"/>
+              <a:t>Cellular Automata in nature</a:t>
             </a:r>
             <a:endParaRPr lang="en-GB" dirty="0" smtClean="0"/>
           </a:p>

</xml_diff>